<commit_message>
Matt / Alexey: Updating the presentation
</commit_message>
<xml_diff>
--- a/play-filters-actions/doc/Scala_School_-_Filters_&_Action_Composition.pptx
+++ b/play-filters-actions/doc/Scala_School_-_Filters_&_Action_Composition.pptx
@@ -33,7 +33,6 @@
     <p:sldId id="279" r:id="rId28"/>
     <p:sldId id="280" r:id="rId29"/>
     <p:sldId id="281" r:id="rId30"/>
-    <p:sldId id="282" r:id="rId31"/>
   </p:sldIdLst>
   <p:sldSz cx="9144000" cy="5143500"/>
   <p:notesSz cx="7559675" cy="10691812"/>
@@ -119,7 +118,7 @@
         <p:spPr>
           <a:xfrm>
             <a:off x="457200" y="1203480"/>
-            <a:ext cx="8228880" cy="1422360"/>
+            <a:ext cx="8229240" cy="1422720"/>
           </a:xfrm>
           <a:prstGeom prst="rect">
             <a:avLst/>
@@ -144,8 +143,8 @@
         </p:nvSpPr>
         <p:spPr>
           <a:xfrm>
-            <a:off x="457200" y="2761200"/>
-            <a:ext cx="8228880" cy="1422360"/>
+            <a:off x="457200" y="2761920"/>
+            <a:ext cx="8229240" cy="1422720"/>
           </a:xfrm>
           <a:prstGeom prst="rect">
             <a:avLst/>
@@ -220,7 +219,7 @@
         <p:spPr>
           <a:xfrm>
             <a:off x="457200" y="1203480"/>
-            <a:ext cx="4015440" cy="1422360"/>
+            <a:ext cx="4015800" cy="1422720"/>
           </a:xfrm>
           <a:prstGeom prst="rect">
             <a:avLst/>
@@ -245,8 +244,8 @@
         </p:nvSpPr>
         <p:spPr>
           <a:xfrm>
-            <a:off x="4673880" y="1203480"/>
-            <a:ext cx="4015440" cy="1422360"/>
+            <a:off x="4674240" y="1203480"/>
+            <a:ext cx="4015800" cy="1422720"/>
           </a:xfrm>
           <a:prstGeom prst="rect">
             <a:avLst/>
@@ -271,8 +270,8 @@
         </p:nvSpPr>
         <p:spPr>
           <a:xfrm>
-            <a:off x="4673880" y="2761200"/>
-            <a:ext cx="4015440" cy="1422360"/>
+            <a:off x="4674240" y="2761920"/>
+            <a:ext cx="4015800" cy="1422720"/>
           </a:xfrm>
           <a:prstGeom prst="rect">
             <a:avLst/>
@@ -297,8 +296,8 @@
         </p:nvSpPr>
         <p:spPr>
           <a:xfrm>
-            <a:off x="457200" y="2761200"/>
-            <a:ext cx="4015440" cy="1422360"/>
+            <a:off x="457200" y="2761920"/>
+            <a:ext cx="4015800" cy="1422720"/>
           </a:xfrm>
           <a:prstGeom prst="rect">
             <a:avLst/>
@@ -373,7 +372,7 @@
         <p:spPr>
           <a:xfrm>
             <a:off x="457200" y="1203480"/>
-            <a:ext cx="8228880" cy="2982600"/>
+            <a:ext cx="8229240" cy="2982960"/>
           </a:xfrm>
           <a:prstGeom prst="rect">
             <a:avLst/>
@@ -399,7 +398,7 @@
         <p:spPr>
           <a:xfrm>
             <a:off x="457200" y="1203480"/>
-            <a:ext cx="8228880" cy="2982600"/>
+            <a:ext cx="8229240" cy="2982960"/>
           </a:xfrm>
           <a:prstGeom prst="rect">
             <a:avLst/>
@@ -426,8 +425,8 @@
         </p:blipFill>
         <p:spPr>
           <a:xfrm>
-            <a:off x="2701800" y="1203120"/>
-            <a:ext cx="3739680" cy="2982600"/>
+            <a:off x="2701440" y="1203480"/>
+            <a:ext cx="3740040" cy="2982960"/>
           </a:xfrm>
           <a:prstGeom prst="rect">
             <a:avLst/>
@@ -451,8 +450,8 @@
         </p:blipFill>
         <p:spPr>
           <a:xfrm>
-            <a:off x="2701800" y="1203120"/>
-            <a:ext cx="3739680" cy="2982600"/>
+            <a:off x="2701440" y="1203480"/>
+            <a:ext cx="3740040" cy="2982960"/>
           </a:xfrm>
           <a:prstGeom prst="rect">
             <a:avLst/>
@@ -546,7 +545,7 @@
         <p:spPr>
           <a:xfrm>
             <a:off x="457200" y="1203480"/>
-            <a:ext cx="8228880" cy="2982960"/>
+            <a:ext cx="8229240" cy="2983320"/>
           </a:xfrm>
           <a:prstGeom prst="rect">
             <a:avLst/>
@@ -622,7 +621,7 @@
         <p:spPr>
           <a:xfrm>
             <a:off x="457200" y="1203480"/>
-            <a:ext cx="8228880" cy="2982600"/>
+            <a:ext cx="8229240" cy="2982960"/>
           </a:xfrm>
           <a:prstGeom prst="rect">
             <a:avLst/>
@@ -697,7 +696,7 @@
         <p:spPr>
           <a:xfrm>
             <a:off x="457200" y="1203480"/>
-            <a:ext cx="4015440" cy="2982600"/>
+            <a:ext cx="4015800" cy="2982960"/>
           </a:xfrm>
           <a:prstGeom prst="rect">
             <a:avLst/>
@@ -722,8 +721,8 @@
         </p:nvSpPr>
         <p:spPr>
           <a:xfrm>
-            <a:off x="4673880" y="1203480"/>
-            <a:ext cx="4015440" cy="2982600"/>
+            <a:off x="4674240" y="1203480"/>
+            <a:ext cx="4015800" cy="2982960"/>
           </a:xfrm>
           <a:prstGeom prst="rect">
             <a:avLst/>
@@ -896,7 +895,7 @@
         <p:spPr>
           <a:xfrm>
             <a:off x="457200" y="1203480"/>
-            <a:ext cx="4015440" cy="1422360"/>
+            <a:ext cx="4015800" cy="1422720"/>
           </a:xfrm>
           <a:prstGeom prst="rect">
             <a:avLst/>
@@ -921,8 +920,8 @@
         </p:nvSpPr>
         <p:spPr>
           <a:xfrm>
-            <a:off x="457200" y="2761200"/>
-            <a:ext cx="4015440" cy="1422360"/>
+            <a:off x="457200" y="2761920"/>
+            <a:ext cx="4015800" cy="1422720"/>
           </a:xfrm>
           <a:prstGeom prst="rect">
             <a:avLst/>
@@ -947,8 +946,8 @@
         </p:nvSpPr>
         <p:spPr>
           <a:xfrm>
-            <a:off x="4673880" y="1203480"/>
-            <a:ext cx="4015440" cy="2982600"/>
+            <a:off x="4674240" y="1203480"/>
+            <a:ext cx="4015800" cy="2982960"/>
           </a:xfrm>
           <a:prstGeom prst="rect">
             <a:avLst/>
@@ -1023,7 +1022,7 @@
         <p:spPr>
           <a:xfrm>
             <a:off x="457200" y="1203480"/>
-            <a:ext cx="8228880" cy="2982960"/>
+            <a:ext cx="8229240" cy="2983320"/>
           </a:xfrm>
           <a:prstGeom prst="rect">
             <a:avLst/>
@@ -1099,7 +1098,7 @@
         <p:spPr>
           <a:xfrm>
             <a:off x="457200" y="1203480"/>
-            <a:ext cx="4015440" cy="2982600"/>
+            <a:ext cx="4015800" cy="2982960"/>
           </a:xfrm>
           <a:prstGeom prst="rect">
             <a:avLst/>
@@ -1124,8 +1123,8 @@
         </p:nvSpPr>
         <p:spPr>
           <a:xfrm>
-            <a:off x="4673880" y="1203480"/>
-            <a:ext cx="4015440" cy="1422360"/>
+            <a:off x="4674240" y="1203480"/>
+            <a:ext cx="4015800" cy="1422720"/>
           </a:xfrm>
           <a:prstGeom prst="rect">
             <a:avLst/>
@@ -1150,8 +1149,8 @@
         </p:nvSpPr>
         <p:spPr>
           <a:xfrm>
-            <a:off x="4673880" y="2761200"/>
-            <a:ext cx="4015440" cy="1422360"/>
+            <a:off x="4674240" y="2761920"/>
+            <a:ext cx="4015800" cy="1422720"/>
           </a:xfrm>
           <a:prstGeom prst="rect">
             <a:avLst/>
@@ -1226,7 +1225,7 @@
         <p:spPr>
           <a:xfrm>
             <a:off x="457200" y="1203480"/>
-            <a:ext cx="4015440" cy="1422360"/>
+            <a:ext cx="4015800" cy="1422720"/>
           </a:xfrm>
           <a:prstGeom prst="rect">
             <a:avLst/>
@@ -1251,8 +1250,8 @@
         </p:nvSpPr>
         <p:spPr>
           <a:xfrm>
-            <a:off x="4673880" y="1203480"/>
-            <a:ext cx="4015440" cy="1422360"/>
+            <a:off x="4674240" y="1203480"/>
+            <a:ext cx="4015800" cy="1422720"/>
           </a:xfrm>
           <a:prstGeom prst="rect">
             <a:avLst/>
@@ -1277,8 +1276,8 @@
         </p:nvSpPr>
         <p:spPr>
           <a:xfrm>
-            <a:off x="457200" y="2761200"/>
-            <a:ext cx="8228880" cy="1422360"/>
+            <a:off x="457200" y="2761920"/>
+            <a:ext cx="8229240" cy="1422720"/>
           </a:xfrm>
           <a:prstGeom prst="rect">
             <a:avLst/>
@@ -1353,7 +1352,7 @@
         <p:spPr>
           <a:xfrm>
             <a:off x="457200" y="1203480"/>
-            <a:ext cx="8228880" cy="1422360"/>
+            <a:ext cx="8229240" cy="1422720"/>
           </a:xfrm>
           <a:prstGeom prst="rect">
             <a:avLst/>
@@ -1378,8 +1377,8 @@
         </p:nvSpPr>
         <p:spPr>
           <a:xfrm>
-            <a:off x="457200" y="2761200"/>
-            <a:ext cx="8228880" cy="1422360"/>
+            <a:off x="457200" y="2761920"/>
+            <a:ext cx="8229240" cy="1422720"/>
           </a:xfrm>
           <a:prstGeom prst="rect">
             <a:avLst/>
@@ -1454,7 +1453,7 @@
         <p:spPr>
           <a:xfrm>
             <a:off x="457200" y="1203480"/>
-            <a:ext cx="4015440" cy="1422360"/>
+            <a:ext cx="4015800" cy="1422720"/>
           </a:xfrm>
           <a:prstGeom prst="rect">
             <a:avLst/>
@@ -1479,8 +1478,8 @@
         </p:nvSpPr>
         <p:spPr>
           <a:xfrm>
-            <a:off x="4673880" y="1203480"/>
-            <a:ext cx="4015440" cy="1422360"/>
+            <a:off x="4674240" y="1203480"/>
+            <a:ext cx="4015800" cy="1422720"/>
           </a:xfrm>
           <a:prstGeom prst="rect">
             <a:avLst/>
@@ -1505,8 +1504,8 @@
         </p:nvSpPr>
         <p:spPr>
           <a:xfrm>
-            <a:off x="4673880" y="2761200"/>
-            <a:ext cx="4015440" cy="1422360"/>
+            <a:off x="4674240" y="2761920"/>
+            <a:ext cx="4015800" cy="1422720"/>
           </a:xfrm>
           <a:prstGeom prst="rect">
             <a:avLst/>
@@ -1531,8 +1530,8 @@
         </p:nvSpPr>
         <p:spPr>
           <a:xfrm>
-            <a:off x="457200" y="2761200"/>
-            <a:ext cx="4015440" cy="1422360"/>
+            <a:off x="457200" y="2761920"/>
+            <a:ext cx="4015800" cy="1422720"/>
           </a:xfrm>
           <a:prstGeom prst="rect">
             <a:avLst/>
@@ -1607,7 +1606,7 @@
         <p:spPr>
           <a:xfrm>
             <a:off x="457200" y="1203480"/>
-            <a:ext cx="8228880" cy="2982600"/>
+            <a:ext cx="8229240" cy="2982960"/>
           </a:xfrm>
           <a:prstGeom prst="rect">
             <a:avLst/>
@@ -1633,7 +1632,7 @@
         <p:spPr>
           <a:xfrm>
             <a:off x="457200" y="1203480"/>
-            <a:ext cx="8228880" cy="2982600"/>
+            <a:ext cx="8229240" cy="2982960"/>
           </a:xfrm>
           <a:prstGeom prst="rect">
             <a:avLst/>
@@ -1660,8 +1659,8 @@
         </p:blipFill>
         <p:spPr>
           <a:xfrm>
-            <a:off x="2701800" y="1203120"/>
-            <a:ext cx="3739680" cy="2982600"/>
+            <a:off x="2701440" y="1203480"/>
+            <a:ext cx="3740040" cy="2982960"/>
           </a:xfrm>
           <a:prstGeom prst="rect">
             <a:avLst/>
@@ -1685,8 +1684,8 @@
         </p:blipFill>
         <p:spPr>
           <a:xfrm>
-            <a:off x="2701800" y="1203120"/>
-            <a:ext cx="3739680" cy="2982600"/>
+            <a:off x="2701440" y="1203480"/>
+            <a:ext cx="3740040" cy="2982960"/>
           </a:xfrm>
           <a:prstGeom prst="rect">
             <a:avLst/>
@@ -1780,7 +1779,7 @@
         <p:spPr>
           <a:xfrm>
             <a:off x="457200" y="1203480"/>
-            <a:ext cx="8228880" cy="2982960"/>
+            <a:ext cx="8229240" cy="2983320"/>
           </a:xfrm>
           <a:prstGeom prst="rect">
             <a:avLst/>
@@ -1856,7 +1855,7 @@
         <p:spPr>
           <a:xfrm>
             <a:off x="457200" y="1203480"/>
-            <a:ext cx="8228880" cy="2982600"/>
+            <a:ext cx="8229240" cy="2982960"/>
           </a:xfrm>
           <a:prstGeom prst="rect">
             <a:avLst/>
@@ -1931,7 +1930,7 @@
         <p:spPr>
           <a:xfrm>
             <a:off x="457200" y="1203480"/>
-            <a:ext cx="4015440" cy="2982600"/>
+            <a:ext cx="4015800" cy="2982960"/>
           </a:xfrm>
           <a:prstGeom prst="rect">
             <a:avLst/>
@@ -1956,8 +1955,8 @@
         </p:nvSpPr>
         <p:spPr>
           <a:xfrm>
-            <a:off x="4673880" y="1203480"/>
-            <a:ext cx="4015440" cy="2982600"/>
+            <a:off x="4674240" y="1203480"/>
+            <a:ext cx="4015800" cy="2982960"/>
           </a:xfrm>
           <a:prstGeom prst="rect">
             <a:avLst/>
@@ -2081,7 +2080,7 @@
         <p:spPr>
           <a:xfrm>
             <a:off x="457200" y="1203480"/>
-            <a:ext cx="8228880" cy="2982600"/>
+            <a:ext cx="8229240" cy="2982960"/>
           </a:xfrm>
           <a:prstGeom prst="rect">
             <a:avLst/>
@@ -2205,7 +2204,7 @@
         <p:spPr>
           <a:xfrm>
             <a:off x="457200" y="1203480"/>
-            <a:ext cx="4015440" cy="1422360"/>
+            <a:ext cx="4015800" cy="1422720"/>
           </a:xfrm>
           <a:prstGeom prst="rect">
             <a:avLst/>
@@ -2230,8 +2229,8 @@
         </p:nvSpPr>
         <p:spPr>
           <a:xfrm>
-            <a:off x="457200" y="2761200"/>
-            <a:ext cx="4015440" cy="1422360"/>
+            <a:off x="457200" y="2761920"/>
+            <a:ext cx="4015800" cy="1422720"/>
           </a:xfrm>
           <a:prstGeom prst="rect">
             <a:avLst/>
@@ -2256,8 +2255,8 @@
         </p:nvSpPr>
         <p:spPr>
           <a:xfrm>
-            <a:off x="4673880" y="1203480"/>
-            <a:ext cx="4015440" cy="2982600"/>
+            <a:off x="4674240" y="1203480"/>
+            <a:ext cx="4015800" cy="2982960"/>
           </a:xfrm>
           <a:prstGeom prst="rect">
             <a:avLst/>
@@ -2332,7 +2331,7 @@
         <p:spPr>
           <a:xfrm>
             <a:off x="457200" y="1203480"/>
-            <a:ext cx="4015440" cy="2982600"/>
+            <a:ext cx="4015800" cy="2982960"/>
           </a:xfrm>
           <a:prstGeom prst="rect">
             <a:avLst/>
@@ -2357,8 +2356,8 @@
         </p:nvSpPr>
         <p:spPr>
           <a:xfrm>
-            <a:off x="4673880" y="1203480"/>
-            <a:ext cx="4015440" cy="1422360"/>
+            <a:off x="4674240" y="1203480"/>
+            <a:ext cx="4015800" cy="1422720"/>
           </a:xfrm>
           <a:prstGeom prst="rect">
             <a:avLst/>
@@ -2383,8 +2382,8 @@
         </p:nvSpPr>
         <p:spPr>
           <a:xfrm>
-            <a:off x="4673880" y="2761200"/>
-            <a:ext cx="4015440" cy="1422360"/>
+            <a:off x="4674240" y="2761920"/>
+            <a:ext cx="4015800" cy="1422720"/>
           </a:xfrm>
           <a:prstGeom prst="rect">
             <a:avLst/>
@@ -2459,7 +2458,7 @@
         <p:spPr>
           <a:xfrm>
             <a:off x="457200" y="1203480"/>
-            <a:ext cx="4015440" cy="1422360"/>
+            <a:ext cx="4015800" cy="1422720"/>
           </a:xfrm>
           <a:prstGeom prst="rect">
             <a:avLst/>
@@ -2484,8 +2483,8 @@
         </p:nvSpPr>
         <p:spPr>
           <a:xfrm>
-            <a:off x="4673880" y="1203480"/>
-            <a:ext cx="4015440" cy="1422360"/>
+            <a:off x="4674240" y="1203480"/>
+            <a:ext cx="4015800" cy="1422720"/>
           </a:xfrm>
           <a:prstGeom prst="rect">
             <a:avLst/>
@@ -2510,8 +2509,8 @@
         </p:nvSpPr>
         <p:spPr>
           <a:xfrm>
-            <a:off x="457200" y="2761200"/>
-            <a:ext cx="8228880" cy="1422360"/>
+            <a:off x="457200" y="2761920"/>
+            <a:ext cx="8229240" cy="1422720"/>
           </a:xfrm>
           <a:prstGeom prst="rect">
             <a:avLst/>
@@ -2586,7 +2585,7 @@
         <p:spPr>
           <a:xfrm>
             <a:off x="457200" y="1203480"/>
-            <a:ext cx="8228880" cy="1422360"/>
+            <a:ext cx="8229240" cy="1422720"/>
           </a:xfrm>
           <a:prstGeom prst="rect">
             <a:avLst/>
@@ -2611,8 +2610,8 @@
         </p:nvSpPr>
         <p:spPr>
           <a:xfrm>
-            <a:off x="457200" y="2761200"/>
-            <a:ext cx="8228880" cy="1422360"/>
+            <a:off x="457200" y="2761920"/>
+            <a:ext cx="8229240" cy="1422720"/>
           </a:xfrm>
           <a:prstGeom prst="rect">
             <a:avLst/>
@@ -2687,7 +2686,7 @@
         <p:spPr>
           <a:xfrm>
             <a:off x="457200" y="1203480"/>
-            <a:ext cx="4015440" cy="1422360"/>
+            <a:ext cx="4015800" cy="1422720"/>
           </a:xfrm>
           <a:prstGeom prst="rect">
             <a:avLst/>
@@ -2712,8 +2711,8 @@
         </p:nvSpPr>
         <p:spPr>
           <a:xfrm>
-            <a:off x="4673880" y="1203480"/>
-            <a:ext cx="4015440" cy="1422360"/>
+            <a:off x="4674240" y="1203480"/>
+            <a:ext cx="4015800" cy="1422720"/>
           </a:xfrm>
           <a:prstGeom prst="rect">
             <a:avLst/>
@@ -2738,8 +2737,8 @@
         </p:nvSpPr>
         <p:spPr>
           <a:xfrm>
-            <a:off x="4673880" y="2761200"/>
-            <a:ext cx="4015440" cy="1422360"/>
+            <a:off x="4674240" y="2761920"/>
+            <a:ext cx="4015800" cy="1422720"/>
           </a:xfrm>
           <a:prstGeom prst="rect">
             <a:avLst/>
@@ -2764,8 +2763,8 @@
         </p:nvSpPr>
         <p:spPr>
           <a:xfrm>
-            <a:off x="457200" y="2761200"/>
-            <a:ext cx="4015440" cy="1422360"/>
+            <a:off x="457200" y="2761920"/>
+            <a:ext cx="4015800" cy="1422720"/>
           </a:xfrm>
           <a:prstGeom prst="rect">
             <a:avLst/>
@@ -2840,7 +2839,7 @@
         <p:spPr>
           <a:xfrm>
             <a:off x="457200" y="1203480"/>
-            <a:ext cx="8228880" cy="2982600"/>
+            <a:ext cx="8229240" cy="2982960"/>
           </a:xfrm>
           <a:prstGeom prst="rect">
             <a:avLst/>
@@ -2866,7 +2865,7 @@
         <p:spPr>
           <a:xfrm>
             <a:off x="457200" y="1203480"/>
-            <a:ext cx="8228880" cy="2982600"/>
+            <a:ext cx="8229240" cy="2982960"/>
           </a:xfrm>
           <a:prstGeom prst="rect">
             <a:avLst/>
@@ -2893,8 +2892,8 @@
         </p:blipFill>
         <p:spPr>
           <a:xfrm>
-            <a:off x="2701800" y="1203120"/>
-            <a:ext cx="3739680" cy="2982600"/>
+            <a:off x="2701440" y="1203480"/>
+            <a:ext cx="3740040" cy="2982960"/>
           </a:xfrm>
           <a:prstGeom prst="rect">
             <a:avLst/>
@@ -2918,8 +2917,8 @@
         </p:blipFill>
         <p:spPr>
           <a:xfrm>
-            <a:off x="2701800" y="1203120"/>
-            <a:ext cx="3739680" cy="2982600"/>
+            <a:off x="2701440" y="1203480"/>
+            <a:ext cx="3740040" cy="2982960"/>
           </a:xfrm>
           <a:prstGeom prst="rect">
             <a:avLst/>
@@ -2991,7 +2990,7 @@
         <p:spPr>
           <a:xfrm>
             <a:off x="457200" y="1203480"/>
-            <a:ext cx="4015440" cy="2982600"/>
+            <a:ext cx="4015800" cy="2982960"/>
           </a:xfrm>
           <a:prstGeom prst="rect">
             <a:avLst/>
@@ -3016,8 +3015,8 @@
         </p:nvSpPr>
         <p:spPr>
           <a:xfrm>
-            <a:off x="4673880" y="1203480"/>
-            <a:ext cx="4015440" cy="2982600"/>
+            <a:off x="4674240" y="1203480"/>
+            <a:ext cx="4015800" cy="2982960"/>
           </a:xfrm>
           <a:prstGeom prst="rect">
             <a:avLst/>
@@ -3190,7 +3189,7 @@
         <p:spPr>
           <a:xfrm>
             <a:off x="457200" y="1203480"/>
-            <a:ext cx="4015440" cy="1422360"/>
+            <a:ext cx="4015800" cy="1422720"/>
           </a:xfrm>
           <a:prstGeom prst="rect">
             <a:avLst/>
@@ -3215,8 +3214,8 @@
         </p:nvSpPr>
         <p:spPr>
           <a:xfrm>
-            <a:off x="457200" y="2761200"/>
-            <a:ext cx="4015440" cy="1422360"/>
+            <a:off x="457200" y="2761920"/>
+            <a:ext cx="4015800" cy="1422720"/>
           </a:xfrm>
           <a:prstGeom prst="rect">
             <a:avLst/>
@@ -3241,8 +3240,8 @@
         </p:nvSpPr>
         <p:spPr>
           <a:xfrm>
-            <a:off x="4673880" y="1203480"/>
-            <a:ext cx="4015440" cy="2982600"/>
+            <a:off x="4674240" y="1203480"/>
+            <a:ext cx="4015800" cy="2982960"/>
           </a:xfrm>
           <a:prstGeom prst="rect">
             <a:avLst/>
@@ -3317,7 +3316,7 @@
         <p:spPr>
           <a:xfrm>
             <a:off x="457200" y="1203480"/>
-            <a:ext cx="4015440" cy="2982600"/>
+            <a:ext cx="4015800" cy="2982960"/>
           </a:xfrm>
           <a:prstGeom prst="rect">
             <a:avLst/>
@@ -3342,8 +3341,8 @@
         </p:nvSpPr>
         <p:spPr>
           <a:xfrm>
-            <a:off x="4673880" y="1203480"/>
-            <a:ext cx="4015440" cy="1422360"/>
+            <a:off x="4674240" y="1203480"/>
+            <a:ext cx="4015800" cy="1422720"/>
           </a:xfrm>
           <a:prstGeom prst="rect">
             <a:avLst/>
@@ -3368,8 +3367,8 @@
         </p:nvSpPr>
         <p:spPr>
           <a:xfrm>
-            <a:off x="4673880" y="2761200"/>
-            <a:ext cx="4015440" cy="1422360"/>
+            <a:off x="4674240" y="2761920"/>
+            <a:ext cx="4015800" cy="1422720"/>
           </a:xfrm>
           <a:prstGeom prst="rect">
             <a:avLst/>
@@ -3444,7 +3443,7 @@
         <p:spPr>
           <a:xfrm>
             <a:off x="457200" y="1203480"/>
-            <a:ext cx="4015440" cy="1422360"/>
+            <a:ext cx="4015800" cy="1422720"/>
           </a:xfrm>
           <a:prstGeom prst="rect">
             <a:avLst/>
@@ -3469,8 +3468,8 @@
         </p:nvSpPr>
         <p:spPr>
           <a:xfrm>
-            <a:off x="4673880" y="1203480"/>
-            <a:ext cx="4015440" cy="1422360"/>
+            <a:off x="4674240" y="1203480"/>
+            <a:ext cx="4015800" cy="1422720"/>
           </a:xfrm>
           <a:prstGeom prst="rect">
             <a:avLst/>
@@ -3495,8 +3494,8 @@
         </p:nvSpPr>
         <p:spPr>
           <a:xfrm>
-            <a:off x="457200" y="2761200"/>
-            <a:ext cx="8228880" cy="1422360"/>
+            <a:off x="457200" y="2761920"/>
+            <a:ext cx="8229240" cy="1422720"/>
           </a:xfrm>
           <a:prstGeom prst="rect">
             <a:avLst/>
@@ -4754,7 +4753,7 @@
                 </a:solidFill>
                 <a:latin typeface="Verdana"/>
               </a:rPr>
-              <a:t>02.02.2016 Matthew Lloyd, Alexey ...</a:t>
+              <a:t>02.02.2016 Matthew Lloyd, Alexey Gravanov</a:t>
             </a:r>
             <a:endParaRPr/>
           </a:p>
@@ -4928,7 +4927,7 @@
               </a:rPr>
               <a:t>Seite </a:t>
             </a:r>
-            <a:fld id="{2240EA74-7FD1-4386-A3AC-EC9394C95FDC}" type="slidenum">
+            <a:fld id="{885DD8A5-9EE2-4325-8F70-762FD1605A99}" type="slidenum">
               <a:rPr lang="en-GB" sz="900">
                 <a:solidFill>
                   <a:srgbClr val="4b4c4d"/>
@@ -5173,7 +5172,7 @@
               </a:rPr>
               <a:t>Seite </a:t>
             </a:r>
-            <a:fld id="{5652FECF-E70D-4760-BDF3-D6D8DB2B0DDF}" type="slidenum">
+            <a:fld id="{615C1995-36D0-4EF9-9610-BFEE09AFF12C}" type="slidenum">
               <a:rPr lang="en-GB" sz="900">
                 <a:solidFill>
                   <a:srgbClr val="4b4c4d"/>
@@ -5458,7 +5457,7 @@
               </a:rPr>
               <a:t>Seite </a:t>
             </a:r>
-            <a:fld id="{5AE74E04-2658-4D76-A284-98B5E9705FB8}" type="slidenum">
+            <a:fld id="{319BDAA8-2642-41DD-81A2-9F4023D8105E}" type="slidenum">
               <a:rPr lang="en-GB" sz="900">
                 <a:solidFill>
                   <a:srgbClr val="ffffff"/>
@@ -5636,7 +5635,7 @@
               </a:rPr>
               <a:t>Seite </a:t>
             </a:r>
-            <a:fld id="{341607EA-FBDE-4F95-8A93-3674D9A9E959}" type="slidenum">
+            <a:fld id="{3F9EC371-4325-4332-8547-562D8B98FC4F}" type="slidenum">
               <a:rPr lang="en-GB" sz="900">
                 <a:solidFill>
                   <a:srgbClr val="4b4c4d"/>
@@ -6062,7 +6061,7 @@
               </a:rPr>
               <a:t>Seite </a:t>
             </a:r>
-            <a:fld id="{038CE74A-C0B9-468A-81FB-82A74A9C33FF}" type="slidenum">
+            <a:fld id="{3F42DF25-00C6-46ED-A9DA-6C3757A22292}" type="slidenum">
               <a:rPr lang="en-GB" sz="900">
                 <a:solidFill>
                   <a:srgbClr val="4b4c4d"/>
@@ -6307,7 +6306,7 @@
               </a:rPr>
               <a:t>Seite </a:t>
             </a:r>
-            <a:fld id="{A7E7BC3F-23F2-4010-B1EA-2DBE7E2F7E2B}" type="slidenum">
+            <a:fld id="{36EFCAB7-105C-4235-8302-6AA95B151D77}" type="slidenum">
               <a:rPr lang="en-GB" sz="900">
                 <a:solidFill>
                   <a:srgbClr val="4b4c4d"/>
@@ -6552,7 +6551,7 @@
               </a:rPr>
               <a:t>Seite </a:t>
             </a:r>
-            <a:fld id="{F8F2D70A-52C4-49F4-96C8-F157B58B076B}" type="slidenum">
+            <a:fld id="{DD35CA1D-DEBF-40D4-B637-A0B01A135602}" type="slidenum">
               <a:rPr lang="en-GB" sz="900">
                 <a:solidFill>
                   <a:srgbClr val="4b4c4d"/>
@@ -6837,7 +6836,7 @@
               </a:rPr>
               <a:t>Seite </a:t>
             </a:r>
-            <a:fld id="{D74F60E2-BF05-459A-9558-65BF4066EBC1}" type="slidenum">
+            <a:fld id="{A138AA47-106B-466E-9B39-F9D7AF07AF2A}" type="slidenum">
               <a:rPr lang="en-GB" sz="900">
                 <a:solidFill>
                   <a:srgbClr val="ffffff"/>
@@ -7024,7 +7023,7 @@
               </a:rPr>
               <a:t>Seite </a:t>
             </a:r>
-            <a:fld id="{51184F31-22CC-4602-BD17-43A247139F33}" type="slidenum">
+            <a:fld id="{FD8BD013-B318-465B-B666-611FFD3D9280}" type="slidenum">
               <a:rPr lang="en-GB" sz="900">
                 <a:solidFill>
                   <a:srgbClr val="4b4c4d"/>
@@ -7378,7 +7377,7 @@
               </a:rPr>
               <a:t>Seite </a:t>
             </a:r>
-            <a:fld id="{FD94C6D5-5127-42D3-A6C0-B0B542F1B208}" type="slidenum">
+            <a:fld id="{29EB7F92-49E1-4C2C-A776-4C25C6669110}" type="slidenum">
               <a:rPr lang="en-GB" sz="900">
                 <a:solidFill>
                   <a:srgbClr val="4b4c4d"/>
@@ -7623,7 +7622,7 @@
               </a:rPr>
               <a:t>Seite </a:t>
             </a:r>
-            <a:fld id="{836AF85A-EEE5-43F6-82A4-99218AA9BE21}" type="slidenum">
+            <a:fld id="{7289EA7B-376D-4F44-818E-C817F33F1BB3}" type="slidenum">
               <a:rPr lang="en-GB" sz="900">
                 <a:solidFill>
                   <a:srgbClr val="4b4c4d"/>
@@ -7974,7 +7973,7 @@
                 </a:solidFill>
                 <a:latin typeface="Verdana"/>
               </a:rPr>
-              <a:t>Filters &amp; Action Composition</a:t>
+              <a:t>Filters &amp; Actions</a:t>
             </a:r>
             <a:endParaRPr/>
           </a:p>
@@ -8096,7 +8095,7 @@
               </a:rPr>
               <a:t>Seite </a:t>
             </a:r>
-            <a:fld id="{B7019269-06FB-4955-BD72-2A18E0E75DA3}" type="slidenum">
+            <a:fld id="{0A1AE28E-0F95-47E5-B04A-C4792240DA28}" type="slidenum">
               <a:rPr lang="en-GB" sz="900">
                 <a:solidFill>
                   <a:srgbClr val="ffffff"/>
@@ -8274,7 +8273,7 @@
               </a:rPr>
               <a:t>Seite </a:t>
             </a:r>
-            <a:fld id="{0CBFF1FB-F62A-4560-86AE-34B03158E201}" type="slidenum">
+            <a:fld id="{04C2C78F-2768-44C2-8556-9F29AD802577}" type="slidenum">
               <a:rPr lang="en-GB" sz="900">
                 <a:solidFill>
                   <a:srgbClr val="4b4c4d"/>
@@ -8603,7 +8602,7 @@
               </a:rPr>
               <a:t>Seite </a:t>
             </a:r>
-            <a:fld id="{9392F41A-71BE-409C-B066-53E925D524E8}" type="slidenum">
+            <a:fld id="{4BAA899D-EF1A-4714-8BDE-4E219626068B}" type="slidenum">
               <a:rPr lang="en-GB" sz="900">
                 <a:solidFill>
                   <a:srgbClr val="4b4c4d"/>
@@ -8848,7 +8847,7 @@
               </a:rPr>
               <a:t>Seite </a:t>
             </a:r>
-            <a:fld id="{E9A56722-BBFB-4E3F-9A44-33BC15BFE457}" type="slidenum">
+            <a:fld id="{15890559-098B-43B9-A945-B16F3CC814C5}" type="slidenum">
               <a:rPr lang="en-GB" sz="900">
                 <a:solidFill>
                   <a:srgbClr val="4b4c4d"/>
@@ -9093,7 +9092,7 @@
               </a:rPr>
               <a:t>Seite </a:t>
             </a:r>
-            <a:fld id="{2CAF78FD-DAF6-4CD1-94BB-EE6C39E4C56A}" type="slidenum">
+            <a:fld id="{8EF5EF7C-80DA-4C30-9EC5-B98068372228}" type="slidenum">
               <a:rPr lang="en-GB" sz="900">
                 <a:solidFill>
                   <a:srgbClr val="4b4c4d"/>
@@ -9363,7 +9362,7 @@
               </a:rPr>
               <a:t>Seite </a:t>
             </a:r>
-            <a:fld id="{5C5BCA1A-1D4F-4BB5-A462-4959963644A9}" type="slidenum">
+            <a:fld id="{61B636B7-30E0-4D13-AE82-C2B4393D9BCB}" type="slidenum">
               <a:rPr lang="en-GB" sz="900">
                 <a:solidFill>
                   <a:srgbClr val="4b4c4d"/>
@@ -9713,7 +9712,7 @@
               </a:rPr>
               <a:t>Seite </a:t>
             </a:r>
-            <a:fld id="{41E85780-E147-4891-BF10-47C05F43F64F}" type="slidenum">
+            <a:fld id="{332E0FA7-EE01-4B49-80E3-60CBC1646954}" type="slidenum">
               <a:rPr lang="en-GB" sz="900">
                 <a:solidFill>
                   <a:srgbClr val="4b4c4d"/>
@@ -9943,135 +9942,6 @@
           <p:childTnLst>
             <p:seq>
               <p:cTn id="52" nodeType="mainSeq"/>
-              <p:prevCondLst>
-                <p:cond delay="0" evt="onPrev">
-                  <p:tgtEl>
-                    <p:sldTgt/>
-                  </p:tgtEl>
-                </p:cond>
-              </p:prevCondLst>
-              <p:nextCondLst>
-                <p:cond delay="0" evt="onNext">
-                  <p:tgtEl>
-                    <p:sldTgt/>
-                  </p:tgtEl>
-                </p:cond>
-              </p:nextCondLst>
-            </p:seq>
-          </p:childTnLst>
-        </p:cTn>
-      </p:par>
-    </p:tnLst>
-  </p:timing>
-</p:sld>
-</file>
-
-<file path=ppt/slides/slide27.xml><?xml version="1.0" encoding="utf-8"?>
-<p:sld xmlns:a="http://schemas.openxmlformats.org/drawingml/2006/main" xmlns:p="http://schemas.openxmlformats.org/presentationml/2006/main" xmlns:r="http://schemas.openxmlformats.org/officeDocument/2006/relationships">
-  <p:cSld>
-    <p:spTree>
-      <p:nvGrpSpPr>
-        <p:cNvPr id="1" name=""/>
-        <p:cNvGrpSpPr/>
-        <p:nvPr/>
-      </p:nvGrpSpPr>
-      <p:grpSpPr>
-        <a:xfrm>
-          <a:off x="0" y="0"/>
-          <a:ext cx="0" cy="0"/>
-          <a:chOff x="0" y="0"/>
-          <a:chExt cx="0" cy="0"/>
-        </a:xfrm>
-      </p:grpSpPr>
-      <p:sp>
-        <p:nvSpPr>
-          <p:cNvPr id="265" name="CustomShape 1"/>
-          <p:cNvSpPr/>
-          <p:nvPr/>
-        </p:nvSpPr>
-        <p:spPr>
-          <a:xfrm>
-            <a:off x="468360" y="3111840"/>
-            <a:ext cx="6118560" cy="970920"/>
-          </a:xfrm>
-          <a:prstGeom prst="rect">
-            <a:avLst/>
-          </a:prstGeom>
-          <a:noFill/>
-          <a:ln>
-            <a:noFill/>
-          </a:ln>
-        </p:spPr>
-        <p:txBody>
-          <a:bodyPr lIns="0" rIns="0" tIns="0" bIns="18000" anchor="b"/>
-          <a:p>
-            <a:pPr>
-              <a:lnSpc>
-                <a:spcPct val="114000"/>
-              </a:lnSpc>
-            </a:pPr>
-            <a:r>
-              <a:rPr b="1" lang="en-GB" sz="3000">
-                <a:solidFill>
-                  <a:srgbClr val="4b4c4d"/>
-                </a:solidFill>
-                <a:latin typeface="Verdana"/>
-              </a:rPr>
-              <a:t>Scala School – Filters &amp; Action Composition</a:t>
-            </a:r>
-            <a:endParaRPr/>
-          </a:p>
-        </p:txBody>
-      </p:sp>
-      <p:sp>
-        <p:nvSpPr>
-          <p:cNvPr id="266" name="CustomShape 2"/>
-          <p:cNvSpPr/>
-          <p:nvPr/>
-        </p:nvSpPr>
-        <p:spPr>
-          <a:xfrm>
-            <a:off x="468360" y="4191840"/>
-            <a:ext cx="6118560" cy="322920"/>
-          </a:xfrm>
-          <a:prstGeom prst="rect">
-            <a:avLst/>
-          </a:prstGeom>
-          <a:noFill/>
-          <a:ln>
-            <a:noFill/>
-          </a:ln>
-        </p:spPr>
-        <p:txBody>
-          <a:bodyPr lIns="0" rIns="0" tIns="0" bIns="36000" anchor="b"/>
-          <a:p>
-            <a:pPr>
-              <a:lnSpc>
-                <a:spcPct val="100000"/>
-              </a:lnSpc>
-            </a:pPr>
-            <a:r>
-              <a:rPr lang="en-GB" sz="1500">
-                <a:solidFill>
-                  <a:srgbClr val="4b4c4d"/>
-                </a:solidFill>
-                <a:latin typeface="Verdana"/>
-              </a:rPr>
-              <a:t>02.02.2016 Matthew Lloyd, Alexey ...</a:t>
-            </a:r>
-            <a:endParaRPr/>
-          </a:p>
-        </p:txBody>
-      </p:sp>
-    </p:spTree>
-  </p:cSld>
-  <p:timing>
-    <p:tnLst>
-      <p:par>
-        <p:cTn id="53" dur="indefinite" restart="never" nodeType="tmRoot">
-          <p:childTnLst>
-            <p:seq>
-              <p:cTn id="54" nodeType="mainSeq"/>
               <p:prevCondLst>
                 <p:cond delay="0" evt="onPrev">
                   <p:tgtEl>
@@ -10268,7 +10138,7 @@
               </a:rPr>
               <a:t>Seite </a:t>
             </a:r>
-            <a:fld id="{52E34AB4-F838-410F-9A6D-A21AD954689C}" type="slidenum">
+            <a:fld id="{F9804F2C-DE48-4BBC-8F44-A72D4F1E913F}" type="slidenum">
               <a:rPr lang="en-GB" sz="900">
                 <a:solidFill>
                   <a:srgbClr val="ffffff"/>
@@ -10446,7 +10316,7 @@
               </a:rPr>
               <a:t>Seite </a:t>
             </a:r>
-            <a:fld id="{AB5113B5-C6B1-423D-A2C5-1462CE21DEB6}" type="slidenum">
+            <a:fld id="{C96C24B2-20E8-421E-8019-344581185E85}" type="slidenum">
               <a:rPr lang="en-GB" sz="900">
                 <a:solidFill>
                   <a:srgbClr val="4b4c4d"/>
@@ -10544,10 +10414,13 @@
             <a:endParaRPr/>
           </a:p>
           <a:p>
-            <a:pPr>
+            <a:pPr lvl="1">
               <a:lnSpc>
                 <a:spcPct val="120000"/>
               </a:lnSpc>
+              <a:buSzPct val="45000"/>
+              <a:buFont typeface="StarSymbol"/>
+              <a:buChar char=""/>
             </a:pPr>
             <a:r>
               <a:rPr lang="en-GB">
@@ -10863,7 +10736,7 @@
               </a:rPr>
               <a:t>Seite </a:t>
             </a:r>
-            <a:fld id="{C504AF96-3893-4E85-A92D-7C19DE8F5450}" type="slidenum">
+            <a:fld id="{1E16E5A1-9432-4883-8AE7-BB5933EC977A}" type="slidenum">
               <a:rPr lang="en-GB" sz="900">
                 <a:solidFill>
                   <a:srgbClr val="4b4c4d"/>
@@ -11108,7 +10981,7 @@
               </a:rPr>
               <a:t>Seite </a:t>
             </a:r>
-            <a:fld id="{9791056C-34A2-417E-A196-59BF7EEC94CD}" type="slidenum">
+            <a:fld id="{48915151-AA9C-4BDE-AE61-A79265465387}" type="slidenum">
               <a:rPr lang="en-GB" sz="900">
                 <a:solidFill>
                   <a:srgbClr val="4b4c4d"/>
@@ -11519,7 +11392,7 @@
               </a:rPr>
               <a:t>Seite </a:t>
             </a:r>
-            <a:fld id="{6E1734EA-D4A1-420F-BBDF-B3351CD54BD5}" type="slidenum">
+            <a:fld id="{5138BD87-CD6F-4B18-91E3-832D25848422}" type="slidenum">
               <a:rPr lang="en-GB" sz="900">
                 <a:solidFill>
                   <a:srgbClr val="4b4c4d"/>
@@ -11804,7 +11677,7 @@
               </a:rPr>
               <a:t>Seite </a:t>
             </a:r>
-            <a:fld id="{51F7A624-AF75-4784-8432-58B9CF9A5D7A}" type="slidenum">
+            <a:fld id="{FA3100DD-9BB9-45DC-BB83-015AF302D194}" type="slidenum">
               <a:rPr lang="en-GB" sz="900">
                 <a:solidFill>
                   <a:srgbClr val="ffffff"/>
@@ -11982,7 +11855,7 @@
               </a:rPr>
               <a:t>Seite </a:t>
             </a:r>
-            <a:fld id="{DE771831-7227-44AF-9F22-E143E881B442}" type="slidenum">
+            <a:fld id="{EE7D59A5-7A84-40C3-950C-A05173F63CD4}" type="slidenum">
               <a:rPr lang="en-GB" sz="900">
                 <a:solidFill>
                   <a:srgbClr val="4b4c4d"/>

</xml_diff>

<commit_message>
Matt: Adding the updated docs for the action composition talk
</commit_message>
<xml_diff>
--- a/play-filters-actions/doc/Scala_School_-_Filters_&_Action_Composition.pptx
+++ b/play-filters-actions/doc/Scala_School_-_Filters_&_Action_Composition.pptx
@@ -4927,7 +4927,7 @@
               </a:rPr>
               <a:t>Seite </a:t>
             </a:r>
-            <a:fld id="{D3C51E2D-1113-4FC1-B244-3E1FD3A9B2EE}" type="slidenum">
+            <a:fld id="{4EF607C9-A2F4-4ECA-A7AE-4E7179317039}" type="slidenum">
               <a:rPr lang="en-GB" sz="900">
                 <a:solidFill>
                   <a:srgbClr val="4b4c4d"/>
@@ -5172,7 +5172,7 @@
               </a:rPr>
               <a:t>Seite </a:t>
             </a:r>
-            <a:fld id="{F82396E9-F18E-4631-8FB2-E307DEC64F3D}" type="slidenum">
+            <a:fld id="{87BFC07F-8823-4065-BC58-8AB3AA165623}" type="slidenum">
               <a:rPr lang="en-GB" sz="900">
                 <a:solidFill>
                   <a:srgbClr val="4b4c4d"/>
@@ -5457,7 +5457,7 @@
               </a:rPr>
               <a:t>Seite </a:t>
             </a:r>
-            <a:fld id="{0D18AF4B-9C3E-4FF5-BDE7-610BAC5DBF69}" type="slidenum">
+            <a:fld id="{F3FCA88D-6F41-4B21-9E94-973DA8EC6636}" type="slidenum">
               <a:rPr lang="en-GB" sz="900">
                 <a:solidFill>
                   <a:srgbClr val="ffffff"/>
@@ -5635,7 +5635,7 @@
               </a:rPr>
               <a:t>Seite </a:t>
             </a:r>
-            <a:fld id="{3C5FD4A7-77B0-48E6-AC61-F1842B891FCC}" type="slidenum">
+            <a:fld id="{73F39F08-1D5A-44FB-83D0-D8EB2A7451BD}" type="slidenum">
               <a:rPr lang="en-GB" sz="900">
                 <a:solidFill>
                   <a:srgbClr val="4b4c4d"/>
@@ -6061,7 +6061,7 @@
               </a:rPr>
               <a:t>Seite </a:t>
             </a:r>
-            <a:fld id="{D37C2944-DA11-4AE9-836F-A6D01C31252A}" type="slidenum">
+            <a:fld id="{BF80837B-A469-4AE4-8144-27723728FE13}" type="slidenum">
               <a:rPr lang="en-GB" sz="900">
                 <a:solidFill>
                   <a:srgbClr val="4b4c4d"/>
@@ -6306,7 +6306,7 @@
               </a:rPr>
               <a:t>Seite </a:t>
             </a:r>
-            <a:fld id="{CB105285-2152-4701-A843-5889940F3BA4}" type="slidenum">
+            <a:fld id="{1123ABAA-3552-48AB-A3E8-1672A65A0C8C}" type="slidenum">
               <a:rPr lang="en-GB" sz="900">
                 <a:solidFill>
                   <a:srgbClr val="4b4c4d"/>
@@ -6551,7 +6551,7 @@
               </a:rPr>
               <a:t>Seite </a:t>
             </a:r>
-            <a:fld id="{F0F824F0-6664-4D64-9944-AEED76C89018}" type="slidenum">
+            <a:fld id="{10BADFF0-E918-4BF8-9A8B-931EFED3730B}" type="slidenum">
               <a:rPr lang="en-GB" sz="900">
                 <a:solidFill>
                   <a:srgbClr val="4b4c4d"/>
@@ -6836,7 +6836,7 @@
               </a:rPr>
               <a:t>Seite </a:t>
             </a:r>
-            <a:fld id="{3156E37C-246C-41F5-9E98-69C6E47B0A22}" type="slidenum">
+            <a:fld id="{5DAE4967-68F1-4AD3-8DE5-2167C68422DB}" type="slidenum">
               <a:rPr lang="en-GB" sz="900">
                 <a:solidFill>
                   <a:srgbClr val="ffffff"/>
@@ -7014,7 +7014,7 @@
               </a:rPr>
               <a:t>Seite </a:t>
             </a:r>
-            <a:fld id="{B7F3927E-3A5F-48A7-B816-9ED142A26881}" type="slidenum">
+            <a:fld id="{37D15D02-6B8E-4F5C-8E97-C551E407C69F}" type="slidenum">
               <a:rPr lang="en-GB" sz="900">
                 <a:solidFill>
                   <a:srgbClr val="4b4c4d"/>
@@ -7368,7 +7368,7 @@
               </a:rPr>
               <a:t>Seite </a:t>
             </a:r>
-            <a:fld id="{4C5EF9DF-2ADA-499F-8A22-46EDBB44BD1B}" type="slidenum">
+            <a:fld id="{FD5A798F-D3EC-4254-A222-31212E1D166A}" type="slidenum">
               <a:rPr lang="en-GB" sz="900">
                 <a:solidFill>
                   <a:srgbClr val="4b4c4d"/>
@@ -7613,7 +7613,7 @@
               </a:rPr>
               <a:t>Seite </a:t>
             </a:r>
-            <a:fld id="{7F598B63-C181-4A94-A021-F23F097BE726}" type="slidenum">
+            <a:fld id="{963861A8-23E6-4D2D-B988-871AFB0A376B}" type="slidenum">
               <a:rPr lang="en-GB" sz="900">
                 <a:solidFill>
                   <a:srgbClr val="4b4c4d"/>
@@ -8086,7 +8086,7 @@
               </a:rPr>
               <a:t>Seite </a:t>
             </a:r>
-            <a:fld id="{3F9911F1-8E26-4511-B079-F193CFA47158}" type="slidenum">
+            <a:fld id="{A48ABBED-3652-4A3F-9697-1B6B94494356}" type="slidenum">
               <a:rPr lang="en-GB" sz="900">
                 <a:solidFill>
                   <a:srgbClr val="ffffff"/>
@@ -8264,7 +8264,7 @@
               </a:rPr>
               <a:t>Seite </a:t>
             </a:r>
-            <a:fld id="{48DF07F7-8822-458E-A5B3-27F0A210BC0C}" type="slidenum">
+            <a:fld id="{E9F113FB-1489-489B-9A0B-08F814670794}" type="slidenum">
               <a:rPr lang="en-GB" sz="900">
                 <a:solidFill>
                   <a:srgbClr val="4b4c4d"/>
@@ -8593,7 +8593,7 @@
               </a:rPr>
               <a:t>Seite </a:t>
             </a:r>
-            <a:fld id="{6929CB30-DA7C-41B7-98BE-67EC87AA170A}" type="slidenum">
+            <a:fld id="{9CF505D5-3330-4A54-979E-5A1E8C8F98A8}" type="slidenum">
               <a:rPr lang="en-GB" sz="900">
                 <a:solidFill>
                   <a:srgbClr val="4b4c4d"/>
@@ -8838,7 +8838,7 @@
               </a:rPr>
               <a:t>Seite </a:t>
             </a:r>
-            <a:fld id="{2DAB165C-6C73-4F50-BC34-C36C6A0566CB}" type="slidenum">
+            <a:fld id="{1F9DAD57-DBF5-4A2E-86A0-3C0F390FAE22}" type="slidenum">
               <a:rPr lang="en-GB" sz="900">
                 <a:solidFill>
                   <a:srgbClr val="4b4c4d"/>
@@ -9083,7 +9083,7 @@
               </a:rPr>
               <a:t>Seite </a:t>
             </a:r>
-            <a:fld id="{2F332CB9-8215-4BBF-90BF-6DA9E3692ECE}" type="slidenum">
+            <a:fld id="{B7E08295-781D-452F-8471-7C22F16B7D7A}" type="slidenum">
               <a:rPr lang="en-GB" sz="900">
                 <a:solidFill>
                   <a:srgbClr val="4b4c4d"/>
@@ -9353,7 +9353,7 @@
               </a:rPr>
               <a:t>Seite </a:t>
             </a:r>
-            <a:fld id="{8D193164-F9CA-43DD-A5D9-8648DD15C01F}" type="slidenum">
+            <a:fld id="{D8E8F6EE-28EE-4539-A758-2DC2507F505C}" type="slidenum">
               <a:rPr lang="en-GB" sz="900">
                 <a:solidFill>
                   <a:srgbClr val="4b4c4d"/>
@@ -9703,7 +9703,7 @@
               </a:rPr>
               <a:t>Seite </a:t>
             </a:r>
-            <a:fld id="{5F9E5EDB-2D33-4A9F-911D-767411238A36}" type="slidenum">
+            <a:fld id="{9544933F-B522-43C0-9FDA-E3CA963F3E4B}" type="slidenum">
               <a:rPr lang="en-GB" sz="900">
                 <a:solidFill>
                   <a:srgbClr val="4b4c4d"/>
@@ -10129,7 +10129,7 @@
               </a:rPr>
               <a:t>Seite </a:t>
             </a:r>
-            <a:fld id="{B31FD56C-6C7A-413C-8A19-431298912A20}" type="slidenum">
+            <a:fld id="{D53E9199-E640-4135-B671-15DCC39D3D0F}" type="slidenum">
               <a:rPr lang="en-GB" sz="900">
                 <a:solidFill>
                   <a:srgbClr val="ffffff"/>
@@ -10307,7 +10307,7 @@
               </a:rPr>
               <a:t>Seite </a:t>
             </a:r>
-            <a:fld id="{0128C693-1467-48D4-8B7C-7156A2406DD7}" type="slidenum">
+            <a:fld id="{CADC1C39-ED40-47BD-B944-F5DB28353455}" type="slidenum">
               <a:rPr lang="en-GB" sz="900">
                 <a:solidFill>
                   <a:srgbClr val="4b4c4d"/>
@@ -10727,7 +10727,7 @@
               </a:rPr>
               <a:t>Seite </a:t>
             </a:r>
-            <a:fld id="{67AD9C23-B4EC-4B59-B172-768BDDF6B1C0}" type="slidenum">
+            <a:fld id="{77B0DB91-F7C0-4B9D-80A5-64163B75F587}" type="slidenum">
               <a:rPr lang="en-GB" sz="900">
                 <a:solidFill>
                   <a:srgbClr val="4b4c4d"/>
@@ -10972,7 +10972,7 @@
               </a:rPr>
               <a:t>Seite </a:t>
             </a:r>
-            <a:fld id="{CCFC8B72-90C6-4F90-8CE2-B69263851FC3}" type="slidenum">
+            <a:fld id="{6F19C542-721E-44E2-850D-497ACD67407E}" type="slidenum">
               <a:rPr lang="en-GB" sz="900">
                 <a:solidFill>
                   <a:srgbClr val="4b4c4d"/>
@@ -11383,7 +11383,7 @@
               </a:rPr>
               <a:t>Seite </a:t>
             </a:r>
-            <a:fld id="{F313A8F9-51C1-4FFE-9C8A-9D847EFACE77}" type="slidenum">
+            <a:fld id="{5FE19A55-103A-41C1-86E8-BCDCA3B78735}" type="slidenum">
               <a:rPr lang="en-GB" sz="900">
                 <a:solidFill>
                   <a:srgbClr val="4b4c4d"/>
@@ -11668,7 +11668,7 @@
               </a:rPr>
               <a:t>Seite </a:t>
             </a:r>
-            <a:fld id="{B998E683-0382-4163-A4DF-C52B50F5551C}" type="slidenum">
+            <a:fld id="{9ED2E4DE-242D-4C97-A206-96D80F0C30C1}" type="slidenum">
               <a:rPr lang="en-GB" sz="900">
                 <a:solidFill>
                   <a:srgbClr val="ffffff"/>
@@ -11846,7 +11846,7 @@
               </a:rPr>
               <a:t>Seite </a:t>
             </a:r>
-            <a:fld id="{74DB871A-2098-4193-AB43-79380FD02739}" type="slidenum">
+            <a:fld id="{E1D6A404-343E-439F-A890-CB7BE4C5B0DD}" type="slidenum">
               <a:rPr lang="en-GB" sz="900">
                 <a:solidFill>
                   <a:srgbClr val="4b4c4d"/>

</xml_diff>